<commit_message>
Week 1 suggestions and edits
</commit_message>
<xml_diff>
--- a/week_1/1.1 Intro to Python.pptx
+++ b/week_1/1.1 Intro to Python.pptx
@@ -222,7 +222,7 @@
           <a:p>
             <a:fld id="{2B1A9BC7-5E19-CB4B-B22A-915B012DE73A}" type="datetimeFigureOut">
               <a:rPr lang="en-US" smtClean="0"/>
-              <a:t>7/10/15</a:t>
+              <a:t>8/22/15</a:t>
             </a:fld>
             <a:endParaRPr lang="en-US"/>
           </a:p>
@@ -1096,7 +1096,7 @@
           <a:p>
             <a:fld id="{145C530C-477C-194C-8B92-CA968C2BDAE6}" type="datetimeFigureOut">
               <a:rPr lang="en-US" smtClean="0"/>
-              <a:t>7/10/15</a:t>
+              <a:t>8/22/15</a:t>
             </a:fld>
             <a:endParaRPr lang="en-US"/>
           </a:p>
@@ -1266,7 +1266,7 @@
           <a:p>
             <a:fld id="{145C530C-477C-194C-8B92-CA968C2BDAE6}" type="datetimeFigureOut">
               <a:rPr lang="en-US" smtClean="0"/>
-              <a:t>7/10/15</a:t>
+              <a:t>8/22/15</a:t>
             </a:fld>
             <a:endParaRPr lang="en-US"/>
           </a:p>
@@ -1446,7 +1446,7 @@
           <a:p>
             <a:fld id="{145C530C-477C-194C-8B92-CA968C2BDAE6}" type="datetimeFigureOut">
               <a:rPr lang="en-US" smtClean="0"/>
-              <a:t>7/10/15</a:t>
+              <a:t>8/22/15</a:t>
             </a:fld>
             <a:endParaRPr lang="en-US"/>
           </a:p>
@@ -1616,7 +1616,7 @@
           <a:p>
             <a:fld id="{145C530C-477C-194C-8B92-CA968C2BDAE6}" type="datetimeFigureOut">
               <a:rPr lang="en-US" smtClean="0"/>
-              <a:t>7/10/15</a:t>
+              <a:t>8/22/15</a:t>
             </a:fld>
             <a:endParaRPr lang="en-US"/>
           </a:p>
@@ -1862,7 +1862,7 @@
           <a:p>
             <a:fld id="{145C530C-477C-194C-8B92-CA968C2BDAE6}" type="datetimeFigureOut">
               <a:rPr lang="en-US" smtClean="0"/>
-              <a:t>7/10/15</a:t>
+              <a:t>8/22/15</a:t>
             </a:fld>
             <a:endParaRPr lang="en-US"/>
           </a:p>
@@ -2150,7 +2150,7 @@
           <a:p>
             <a:fld id="{145C530C-477C-194C-8B92-CA968C2BDAE6}" type="datetimeFigureOut">
               <a:rPr lang="en-US" smtClean="0"/>
-              <a:t>7/10/15</a:t>
+              <a:t>8/22/15</a:t>
             </a:fld>
             <a:endParaRPr lang="en-US"/>
           </a:p>
@@ -2572,7 +2572,7 @@
           <a:p>
             <a:fld id="{145C530C-477C-194C-8B92-CA968C2BDAE6}" type="datetimeFigureOut">
               <a:rPr lang="en-US" smtClean="0"/>
-              <a:t>7/10/15</a:t>
+              <a:t>8/22/15</a:t>
             </a:fld>
             <a:endParaRPr lang="en-US"/>
           </a:p>
@@ -2690,7 +2690,7 @@
           <a:p>
             <a:fld id="{145C530C-477C-194C-8B92-CA968C2BDAE6}" type="datetimeFigureOut">
               <a:rPr lang="en-US" smtClean="0"/>
-              <a:t>7/10/15</a:t>
+              <a:t>8/22/15</a:t>
             </a:fld>
             <a:endParaRPr lang="en-US"/>
           </a:p>
@@ -2785,7 +2785,7 @@
           <a:p>
             <a:fld id="{145C530C-477C-194C-8B92-CA968C2BDAE6}" type="datetimeFigureOut">
               <a:rPr lang="en-US" smtClean="0"/>
-              <a:t>7/10/15</a:t>
+              <a:t>8/22/15</a:t>
             </a:fld>
             <a:endParaRPr lang="en-US"/>
           </a:p>
@@ -3062,7 +3062,7 @@
           <a:p>
             <a:fld id="{145C530C-477C-194C-8B92-CA968C2BDAE6}" type="datetimeFigureOut">
               <a:rPr lang="en-US" smtClean="0"/>
-              <a:t>7/10/15</a:t>
+              <a:t>8/22/15</a:t>
             </a:fld>
             <a:endParaRPr lang="en-US"/>
           </a:p>
@@ -3315,7 +3315,7 @@
           <a:p>
             <a:fld id="{145C530C-477C-194C-8B92-CA968C2BDAE6}" type="datetimeFigureOut">
               <a:rPr lang="en-US" smtClean="0"/>
-              <a:t>7/10/15</a:t>
+              <a:t>8/22/15</a:t>
             </a:fld>
             <a:endParaRPr lang="en-US"/>
           </a:p>
@@ -3528,7 +3528,7 @@
           <a:p>
             <a:fld id="{145C530C-477C-194C-8B92-CA968C2BDAE6}" type="datetimeFigureOut">
               <a:rPr lang="en-US" smtClean="0"/>
-              <a:t>7/10/15</a:t>
+              <a:t>8/22/15</a:t>
             </a:fld>
             <a:endParaRPr lang="en-US"/>
           </a:p>
@@ -4594,7 +4594,11 @@
           <a:bodyPr/>
           <a:lstStyle/>
           <a:p>
-            <a:endParaRPr lang="en-US"/>
+            <a:r>
+              <a:rPr lang="en-US" dirty="0" smtClean="0"/>
+              <a:t>High Level Languages</a:t>
+            </a:r>
+            <a:endParaRPr lang="en-US" dirty="0"/>
           </a:p>
         </p:txBody>
       </p:sp>
@@ -4630,19 +4634,7 @@
             <a:pPr lvl="1"/>
             <a:r>
               <a:rPr lang="en-US" dirty="0" smtClean="0"/>
-              <a:t>For example,</a:t>
-            </a:r>
-            <a:r>
-              <a:rPr lang="en-US" dirty="0" smtClean="0"/>
-              <a:t> </a:t>
-            </a:r>
-            <a:r>
-              <a:rPr lang="en-US" dirty="0" smtClean="0"/>
-              <a:t>memory is allocated automatically</a:t>
-            </a:r>
-            <a:r>
-              <a:rPr lang="en-US" dirty="0" smtClean="0"/>
-              <a:t>.</a:t>
+              <a:t>For example, memory is allocated automatically.</a:t>
             </a:r>
           </a:p>
           <a:p>
@@ -4651,7 +4643,6 @@
               <a:rPr lang="en-US" dirty="0" smtClean="0"/>
               <a:t>You don’t need to ever know what memory address you’re using.</a:t>
             </a:r>
-            <a:endParaRPr lang="en-US" dirty="0" smtClean="0"/>
           </a:p>
           <a:p>
             <a:pPr lvl="2"/>
@@ -5269,7 +5260,7 @@
         </p:blipFill>
         <p:spPr bwMode="auto">
           <a:xfrm>
-            <a:off x="5811837" y="2498725"/>
+            <a:off x="5811837" y="2729629"/>
             <a:ext cx="1609725" cy="1765300"/>
           </a:xfrm>
           <a:prstGeom prst="rect">
@@ -6965,41 +6956,49 @@
       </p:grpSpPr>
       <p:sp>
         <p:nvSpPr>
-          <p:cNvPr id="2" name="Title 1"/>
-          <p:cNvSpPr>
-            <a:spLocks noGrp="1"/>
-          </p:cNvSpPr>
-          <p:nvPr>
-            <p:ph type="title"/>
-          </p:nvPr>
-        </p:nvSpPr>
-        <p:spPr/>
-        <p:txBody>
-          <a:bodyPr/>
-          <a:lstStyle/>
-          <a:p>
-            <a:endParaRPr lang="en-US"/>
-          </a:p>
-        </p:txBody>
-      </p:sp>
-      <p:sp>
-        <p:nvSpPr>
-          <p:cNvPr id="3" name="Content Placeholder 2"/>
-          <p:cNvSpPr>
-            <a:spLocks noGrp="1"/>
-          </p:cNvSpPr>
-          <p:nvPr>
-            <p:ph idx="1"/>
-          </p:nvPr>
-        </p:nvSpPr>
-        <p:spPr/>
-        <p:txBody>
-          <a:bodyPr/>
-          <a:lstStyle/>
-          <a:p>
-            <a:r>
-              <a:rPr lang="en-US" dirty="0" smtClean="0"/>
-              <a:t>Let’s take a look at some code in different languages.</a:t>
+          <p:cNvPr id="4" name="Title 3"/>
+          <p:cNvSpPr txBox="1">
+            <a:spLocks/>
+          </p:cNvSpPr>
+          <p:nvPr/>
+        </p:nvSpPr>
+        <p:spPr>
+          <a:xfrm>
+            <a:off x="685800" y="2130425"/>
+            <a:ext cx="7772400" cy="1470025"/>
+          </a:xfrm>
+          <a:prstGeom prst="rect">
+            <a:avLst/>
+          </a:prstGeom>
+        </p:spPr>
+        <p:txBody>
+          <a:bodyPr vert="horz" lIns="91440" tIns="45720" rIns="91440" bIns="45720" rtlCol="0" anchor="ctr">
+            <a:normAutofit/>
+          </a:bodyPr>
+          <a:lstStyle>
+            <a:lvl1pPr algn="ctr" defTabSz="457200" rtl="0" eaLnBrk="1" latinLnBrk="0" hangingPunct="1">
+              <a:spcBef>
+                <a:spcPct val="0"/>
+              </a:spcBef>
+              <a:buNone/>
+              <a:defRPr sz="4400" kern="1200">
+                <a:solidFill>
+                  <a:schemeClr val="tx1"/>
+                </a:solidFill>
+                <a:latin typeface="+mj-lt"/>
+                <a:ea typeface="+mj-ea"/>
+                <a:cs typeface="+mj-cs"/>
+              </a:defRPr>
+            </a:lvl1pPr>
+          </a:lstStyle>
+          <a:p>
+            <a:r>
+              <a:rPr lang="en-US" dirty="0"/>
+              <a:t>Let’s take a look at some code in different </a:t>
+            </a:r>
+            <a:r>
+              <a:rPr lang="en-US" dirty="0" smtClean="0"/>
+              <a:t>languages:</a:t>
             </a:r>
             <a:endParaRPr lang="en-US" dirty="0"/>
           </a:p>

</xml_diff>